<commit_message>
Redux: The Single Immutable State Tree Redux: Describing State Changes with Actions Redux: Pure and Impure Functions
</commit_message>
<xml_diff>
--- a/Getting Started with Redux.pptx
+++ b/Getting Started with Redux.pptx
@@ -6,6 +6,11 @@
   </p:sldMasterIdLst>
   <p:sldIdLst>
     <p:sldId id="259" r:id="rId2"/>
+    <p:sldId id="260" r:id="rId3"/>
+    <p:sldId id="261" r:id="rId4"/>
+    <p:sldId id="262" r:id="rId5"/>
+    <p:sldId id="263" r:id="rId6"/>
+    <p:sldId id="264" r:id="rId7"/>
   </p:sldIdLst>
   <p:sldSz cx="9144000" cy="6858000" type="screen4x3"/>
   <p:notesSz cx="6858000" cy="9144000"/>
@@ -108,7 +113,7 @@
 </file>
 
 <file path=ppt/slideLayouts/slideLayout1.xml><?xml version="1.0" encoding="utf-8"?>
-<p:sldLayout xmlns:a="http://schemas.openxmlformats.org/drawingml/2006/main" xmlns:r="http://schemas.openxmlformats.org/officeDocument/2006/relationships" xmlns:p="http://schemas.openxmlformats.org/presentationml/2006/main" type="title" preserve="1">
+<p:sldLayout xmlns:a="http://schemas.openxmlformats.org/drawingml/2006/main" xmlns:r="http://schemas.openxmlformats.org/officeDocument/2006/relationships" xmlns:p="http://schemas.openxmlformats.org/presentationml/2006/main" showMasterSp="0" type="title" preserve="1">
   <p:cSld name="Title Slide">
     <p:spTree>
       <p:nvGrpSpPr>
@@ -345,7 +350,7 @@
             <a:fld id="{1D8BD707-D9CF-40AE-B4C6-C98DA3205C09}" type="datetimeFigureOut">
               <a:rPr lang="en-US" smtClean="0"/>
               <a:pPr/>
-              <a:t>16-Jan-18</a:t>
+              <a:t>17-Jan-18</a:t>
             </a:fld>
             <a:endParaRPr lang="en-US"/>
           </a:p>
@@ -403,7 +408,7 @@
 </file>
 
 <file path=ppt/slideLayouts/slideLayout10.xml><?xml version="1.0" encoding="utf-8"?>
-<p:sldLayout xmlns:a="http://schemas.openxmlformats.org/drawingml/2006/main" xmlns:r="http://schemas.openxmlformats.org/officeDocument/2006/relationships" xmlns:p="http://schemas.openxmlformats.org/presentationml/2006/main" type="vertTx" preserve="1">
+<p:sldLayout xmlns:a="http://schemas.openxmlformats.org/drawingml/2006/main" xmlns:r="http://schemas.openxmlformats.org/officeDocument/2006/relationships" xmlns:p="http://schemas.openxmlformats.org/presentationml/2006/main" showMasterSp="0" type="vertTx" preserve="1">
   <p:cSld name="Title and Vertical Text">
     <p:spTree>
       <p:nvGrpSpPr>
@@ -517,7 +522,7 @@
             <a:fld id="{1D8BD707-D9CF-40AE-B4C6-C98DA3205C09}" type="datetimeFigureOut">
               <a:rPr lang="en-US" smtClean="0"/>
               <a:pPr/>
-              <a:t>16-Jan-18</a:t>
+              <a:t>17-Jan-18</a:t>
             </a:fld>
             <a:endParaRPr lang="en-US"/>
           </a:p>
@@ -575,7 +580,7 @@
 </file>
 
 <file path=ppt/slideLayouts/slideLayout11.xml><?xml version="1.0" encoding="utf-8"?>
-<p:sldLayout xmlns:a="http://schemas.openxmlformats.org/drawingml/2006/main" xmlns:r="http://schemas.openxmlformats.org/officeDocument/2006/relationships" xmlns:p="http://schemas.openxmlformats.org/presentationml/2006/main" type="vertTitleAndTx" preserve="1">
+<p:sldLayout xmlns:a="http://schemas.openxmlformats.org/drawingml/2006/main" xmlns:r="http://schemas.openxmlformats.org/officeDocument/2006/relationships" xmlns:p="http://schemas.openxmlformats.org/presentationml/2006/main" showMasterSp="0" type="vertTitleAndTx" preserve="1">
   <p:cSld name="Vertical Title and Text">
     <p:spTree>
       <p:nvGrpSpPr>
@@ -694,7 +699,7 @@
             <a:fld id="{1D8BD707-D9CF-40AE-B4C6-C98DA3205C09}" type="datetimeFigureOut">
               <a:rPr lang="en-US" smtClean="0"/>
               <a:pPr/>
-              <a:t>16-Jan-18</a:t>
+              <a:t>17-Jan-18</a:t>
             </a:fld>
             <a:endParaRPr lang="en-US"/>
           </a:p>
@@ -752,7 +757,7 @@
 </file>
 
 <file path=ppt/slideLayouts/slideLayout2.xml><?xml version="1.0" encoding="utf-8"?>
-<p:sldLayout xmlns:a="http://schemas.openxmlformats.org/drawingml/2006/main" xmlns:r="http://schemas.openxmlformats.org/officeDocument/2006/relationships" xmlns:p="http://schemas.openxmlformats.org/presentationml/2006/main" type="obj" preserve="1">
+<p:sldLayout xmlns:a="http://schemas.openxmlformats.org/drawingml/2006/main" xmlns:r="http://schemas.openxmlformats.org/officeDocument/2006/relationships" xmlns:p="http://schemas.openxmlformats.org/presentationml/2006/main" showMasterSp="0" type="obj" preserve="1">
   <p:cSld name="Title and Content">
     <p:spTree>
       <p:nvGrpSpPr>
@@ -861,7 +866,7 @@
             <a:fld id="{1D8BD707-D9CF-40AE-B4C6-C98DA3205C09}" type="datetimeFigureOut">
               <a:rPr lang="en-US" smtClean="0"/>
               <a:pPr/>
-              <a:t>16-Jan-18</a:t>
+              <a:t>17-Jan-18</a:t>
             </a:fld>
             <a:endParaRPr lang="en-US"/>
           </a:p>
@@ -919,7 +924,7 @@
 </file>
 
 <file path=ppt/slideLayouts/slideLayout3.xml><?xml version="1.0" encoding="utf-8"?>
-<p:sldLayout xmlns:a="http://schemas.openxmlformats.org/drawingml/2006/main" xmlns:r="http://schemas.openxmlformats.org/officeDocument/2006/relationships" xmlns:p="http://schemas.openxmlformats.org/presentationml/2006/main" type="secHead" preserve="1">
+<p:sldLayout xmlns:a="http://schemas.openxmlformats.org/drawingml/2006/main" xmlns:r="http://schemas.openxmlformats.org/officeDocument/2006/relationships" xmlns:p="http://schemas.openxmlformats.org/presentationml/2006/main" showMasterSp="0" type="secHead" preserve="1">
   <p:cSld name="Section Header">
     <p:spTree>
       <p:nvGrpSpPr>
@@ -1120,7 +1125,7 @@
             <a:fld id="{1D8BD707-D9CF-40AE-B4C6-C98DA3205C09}" type="datetimeFigureOut">
               <a:rPr lang="en-US" smtClean="0"/>
               <a:pPr/>
-              <a:t>16-Jan-18</a:t>
+              <a:t>17-Jan-18</a:t>
             </a:fld>
             <a:endParaRPr lang="en-US"/>
           </a:p>
@@ -1228,7 +1233,7 @@
 </file>
 
 <file path=ppt/slideLayouts/slideLayout4.xml><?xml version="1.0" encoding="utf-8"?>
-<p:sldLayout xmlns:a="http://schemas.openxmlformats.org/drawingml/2006/main" xmlns:r="http://schemas.openxmlformats.org/officeDocument/2006/relationships" xmlns:p="http://schemas.openxmlformats.org/presentationml/2006/main" type="twoObj" preserve="1">
+<p:sldLayout xmlns:a="http://schemas.openxmlformats.org/drawingml/2006/main" xmlns:r="http://schemas.openxmlformats.org/officeDocument/2006/relationships" xmlns:p="http://schemas.openxmlformats.org/presentationml/2006/main" showMasterSp="0" type="twoObj" preserve="1">
   <p:cSld name="Two Content">
     <p:spTree>
       <p:nvGrpSpPr>
@@ -1262,7 +1267,7 @@
             <a:fld id="{1D8BD707-D9CF-40AE-B4C6-C98DA3205C09}" type="datetimeFigureOut">
               <a:rPr lang="en-US" smtClean="0"/>
               <a:pPr/>
-              <a:t>16-Jan-18</a:t>
+              <a:t>17-Jan-18</a:t>
             </a:fld>
             <a:endParaRPr lang="en-US"/>
           </a:p>
@@ -1457,7 +1462,7 @@
 </file>
 
 <file path=ppt/slideLayouts/slideLayout5.xml><?xml version="1.0" encoding="utf-8"?>
-<p:sldLayout xmlns:a="http://schemas.openxmlformats.org/drawingml/2006/main" xmlns:r="http://schemas.openxmlformats.org/officeDocument/2006/relationships" xmlns:p="http://schemas.openxmlformats.org/presentationml/2006/main" type="twoTxTwoObj" preserve="1">
+<p:sldLayout xmlns:a="http://schemas.openxmlformats.org/drawingml/2006/main" xmlns:r="http://schemas.openxmlformats.org/officeDocument/2006/relationships" xmlns:p="http://schemas.openxmlformats.org/presentationml/2006/main" showMasterSp="0" type="twoTxTwoObj" preserve="1">
   <p:cSld name="Comparison">
     <p:spTree>
       <p:nvGrpSpPr>
@@ -1914,7 +1919,7 @@
             <a:fld id="{1D8BD707-D9CF-40AE-B4C6-C98DA3205C09}" type="datetimeFigureOut">
               <a:rPr lang="en-US" smtClean="0"/>
               <a:pPr/>
-              <a:t>16-Jan-18</a:t>
+              <a:t>17-Jan-18</a:t>
             </a:fld>
             <a:endParaRPr lang="en-US"/>
           </a:p>
@@ -1972,7 +1977,7 @@
 </file>
 
 <file path=ppt/slideLayouts/slideLayout6.xml><?xml version="1.0" encoding="utf-8"?>
-<p:sldLayout xmlns:a="http://schemas.openxmlformats.org/drawingml/2006/main" xmlns:r="http://schemas.openxmlformats.org/officeDocument/2006/relationships" xmlns:p="http://schemas.openxmlformats.org/presentationml/2006/main" type="titleOnly" preserve="1">
+<p:sldLayout xmlns:a="http://schemas.openxmlformats.org/drawingml/2006/main" xmlns:r="http://schemas.openxmlformats.org/officeDocument/2006/relationships" xmlns:p="http://schemas.openxmlformats.org/presentationml/2006/main" showMasterSp="0" type="titleOnly" preserve="1">
   <p:cSld name="Title Only">
     <p:spTree>
       <p:nvGrpSpPr>
@@ -2029,7 +2034,7 @@
             <a:fld id="{1D8BD707-D9CF-40AE-B4C6-C98DA3205C09}" type="datetimeFigureOut">
               <a:rPr lang="en-US" smtClean="0"/>
               <a:pPr/>
-              <a:t>16-Jan-18</a:t>
+              <a:t>17-Jan-18</a:t>
             </a:fld>
             <a:endParaRPr lang="en-US"/>
           </a:p>
@@ -2087,7 +2092,7 @@
 </file>
 
 <file path=ppt/slideLayouts/slideLayout7.xml><?xml version="1.0" encoding="utf-8"?>
-<p:sldLayout xmlns:a="http://schemas.openxmlformats.org/drawingml/2006/main" xmlns:r="http://schemas.openxmlformats.org/officeDocument/2006/relationships" xmlns:p="http://schemas.openxmlformats.org/presentationml/2006/main" type="blank" preserve="1">
+<p:sldLayout xmlns:a="http://schemas.openxmlformats.org/drawingml/2006/main" xmlns:r="http://schemas.openxmlformats.org/officeDocument/2006/relationships" xmlns:p="http://schemas.openxmlformats.org/presentationml/2006/main" showMasterSp="0" type="blank" preserve="1">
   <p:cSld name="Blank">
     <p:spTree>
       <p:nvGrpSpPr>
@@ -2121,7 +2126,7 @@
             <a:fld id="{1D8BD707-D9CF-40AE-B4C6-C98DA3205C09}" type="datetimeFigureOut">
               <a:rPr lang="en-US" smtClean="0"/>
               <a:pPr/>
-              <a:t>16-Jan-18</a:t>
+              <a:t>17-Jan-18</a:t>
             </a:fld>
             <a:endParaRPr lang="en-US"/>
           </a:p>
@@ -2179,7 +2184,7 @@
 </file>
 
 <file path=ppt/slideLayouts/slideLayout8.xml><?xml version="1.0" encoding="utf-8"?>
-<p:sldLayout xmlns:a="http://schemas.openxmlformats.org/drawingml/2006/main" xmlns:r="http://schemas.openxmlformats.org/officeDocument/2006/relationships" xmlns:p="http://schemas.openxmlformats.org/presentationml/2006/main" type="objTx" preserve="1">
+<p:sldLayout xmlns:a="http://schemas.openxmlformats.org/drawingml/2006/main" xmlns:r="http://schemas.openxmlformats.org/officeDocument/2006/relationships" xmlns:p="http://schemas.openxmlformats.org/presentationml/2006/main" showMasterSp="0" type="objTx" preserve="1">
   <p:cSld name="Content with Caption">
     <p:spTree>
       <p:nvGrpSpPr>
@@ -2413,7 +2418,7 @@
             <a:fld id="{1D8BD707-D9CF-40AE-B4C6-C98DA3205C09}" type="datetimeFigureOut">
               <a:rPr lang="en-US" smtClean="0"/>
               <a:pPr/>
-              <a:t>16-Jan-18</a:t>
+              <a:t>17-Jan-18</a:t>
             </a:fld>
             <a:endParaRPr lang="en-US"/>
           </a:p>
@@ -2494,7 +2499,7 @@
 </file>
 
 <file path=ppt/slideLayouts/slideLayout9.xml><?xml version="1.0" encoding="utf-8"?>
-<p:sldLayout xmlns:a="http://schemas.openxmlformats.org/drawingml/2006/main" xmlns:r="http://schemas.openxmlformats.org/officeDocument/2006/relationships" xmlns:p="http://schemas.openxmlformats.org/presentationml/2006/main" type="picTx" preserve="1">
+<p:sldLayout xmlns:a="http://schemas.openxmlformats.org/drawingml/2006/main" xmlns:r="http://schemas.openxmlformats.org/officeDocument/2006/relationships" xmlns:p="http://schemas.openxmlformats.org/presentationml/2006/main" showMasterSp="0" type="picTx" preserve="1">
   <p:cSld name="Picture with Caption">
     <p:spTree>
       <p:nvGrpSpPr>
@@ -2738,7 +2743,7 @@
             <a:fld id="{1D8BD707-D9CF-40AE-B4C6-C98DA3205C09}" type="datetimeFigureOut">
               <a:rPr lang="en-US" smtClean="0"/>
               <a:pPr/>
-              <a:t>16-Jan-18</a:t>
+              <a:t>17-Jan-18</a:t>
             </a:fld>
             <a:endParaRPr lang="en-US"/>
           </a:p>
@@ -3197,7 +3202,7 @@
             <a:fld id="{1D8BD707-D9CF-40AE-B4C6-C98DA3205C09}" type="datetimeFigureOut">
               <a:rPr lang="en-US" smtClean="0"/>
               <a:pPr/>
-              <a:t>16-Jan-18</a:t>
+              <a:t>17-Jan-18</a:t>
             </a:fld>
             <a:endParaRPr lang="en-US"/>
           </a:p>
@@ -3692,7 +3697,7 @@
 </file>
 
 <file path=ppt/slides/slide1.xml><?xml version="1.0" encoding="utf-8"?>
-<p:sld xmlns:a="http://schemas.openxmlformats.org/drawingml/2006/main" xmlns:r="http://schemas.openxmlformats.org/officeDocument/2006/relationships" xmlns:p="http://schemas.openxmlformats.org/presentationml/2006/main">
+<p:sld xmlns:a="http://schemas.openxmlformats.org/drawingml/2006/main" xmlns:r="http://schemas.openxmlformats.org/officeDocument/2006/relationships" xmlns:p="http://schemas.openxmlformats.org/presentationml/2006/main" showMasterSp="0">
   <p:cSld>
     <p:spTree>
       <p:nvGrpSpPr>
@@ -3724,10 +3729,14 @@
           <a:lstStyle/>
           <a:p>
             <a:r>
-              <a:rPr lang="en-US" dirty="0" smtClean="0"/>
+              <a:rPr lang="en-US" dirty="0" smtClean="0">
+                <a:latin typeface="Comic Sans MS" panose="030F0702030302020204" pitchFamily="66" charset="0"/>
+              </a:rPr>
               <a:t>Redux</a:t>
             </a:r>
-            <a:endParaRPr lang="en-US" dirty="0"/>
+            <a:endParaRPr lang="en-US" dirty="0">
+              <a:latin typeface="Comic Sans MS" panose="030F0702030302020204" pitchFamily="66" charset="0"/>
+            </a:endParaRPr>
           </a:p>
         </p:txBody>
       </p:sp>
@@ -3744,21 +3753,24 @@
         <p:spPr/>
         <p:txBody>
           <a:bodyPr>
-            <a:normAutofit fontScale="92500" lnSpcReduction="10000"/>
+            <a:normAutofit fontScale="77500" lnSpcReduction="20000"/>
           </a:bodyPr>
           <a:lstStyle/>
           <a:p>
             <a:r>
-              <a:rPr lang="en-US" dirty="0" smtClean="0"/>
+              <a:rPr lang="en-US" dirty="0" smtClean="0">
+                <a:latin typeface="Comic Sans MS" panose="030F0702030302020204" pitchFamily="66" charset="0"/>
+              </a:rPr>
               <a:t>By Prateek Magarde</a:t>
             </a:r>
           </a:p>
           <a:p>
             <a:r>
-              <a:rPr lang="en-US" dirty="0"/>
+              <a:rPr lang="en-US" dirty="0">
+                <a:latin typeface="Comic Sans MS" panose="030F0702030302020204" pitchFamily="66" charset="0"/>
+              </a:rPr>
               <a:t>https://egghead.io/courses/getting-started-with-redux</a:t>
             </a:r>
-            <a:endParaRPr lang="en-US" dirty="0"/>
           </a:p>
         </p:txBody>
       </p:sp>
@@ -3766,6 +3778,892 @@
     <p:extLst>
       <p:ext uri="{BB962C8B-B14F-4D97-AF65-F5344CB8AC3E}">
         <p14:creationId xmlns:p14="http://schemas.microsoft.com/office/powerpoint/2010/main" val="3707035879"/>
+      </p:ext>
+    </p:extLst>
+  </p:cSld>
+  <p:clrMapOvr>
+    <a:masterClrMapping/>
+  </p:clrMapOvr>
+</p:sld>
+</file>
+
+<file path=ppt/slides/slide2.xml><?xml version="1.0" encoding="utf-8"?>
+<p:sld xmlns:a="http://schemas.openxmlformats.org/drawingml/2006/main" xmlns:r="http://schemas.openxmlformats.org/officeDocument/2006/relationships" xmlns:p="http://schemas.openxmlformats.org/presentationml/2006/main" showMasterSp="0">
+  <p:cSld>
+    <p:spTree>
+      <p:nvGrpSpPr>
+        <p:cNvPr id="1" name=""/>
+        <p:cNvGrpSpPr/>
+        <p:nvPr/>
+      </p:nvGrpSpPr>
+      <p:grpSpPr>
+        <a:xfrm>
+          <a:off x="0" y="0"/>
+          <a:ext cx="0" cy="0"/>
+          <a:chOff x="0" y="0"/>
+          <a:chExt cx="0" cy="0"/>
+        </a:xfrm>
+      </p:grpSpPr>
+      <p:sp>
+        <p:nvSpPr>
+          <p:cNvPr id="6" name="TextBox 5"/>
+          <p:cNvSpPr txBox="1"/>
+          <p:nvPr/>
+        </p:nvSpPr>
+        <p:spPr>
+          <a:xfrm>
+            <a:off x="228600" y="304800"/>
+            <a:ext cx="3316934" cy="461665"/>
+          </a:xfrm>
+          <a:prstGeom prst="rect">
+            <a:avLst/>
+          </a:prstGeom>
+          <a:noFill/>
+        </p:spPr>
+        <p:txBody>
+          <a:bodyPr wrap="none" rtlCol="0">
+            <a:spAutoFit/>
+          </a:bodyPr>
+          <a:lstStyle/>
+          <a:p>
+            <a:r>
+              <a:rPr lang="en-US" sz="2400" b="1" dirty="0" smtClean="0">
+                <a:latin typeface="Comic Sans MS" panose="030F0702030302020204" pitchFamily="66" charset="0"/>
+              </a:rPr>
+              <a:t>Redux – Introduction</a:t>
+            </a:r>
+            <a:endParaRPr lang="en-US" sz="2400" b="1" dirty="0">
+              <a:latin typeface="Comic Sans MS" panose="030F0702030302020204" pitchFamily="66" charset="0"/>
+            </a:endParaRPr>
+          </a:p>
+        </p:txBody>
+      </p:sp>
+      <p:sp>
+        <p:nvSpPr>
+          <p:cNvPr id="8" name="TextBox 7"/>
+          <p:cNvSpPr txBox="1"/>
+          <p:nvPr/>
+        </p:nvSpPr>
+        <p:spPr>
+          <a:xfrm>
+            <a:off x="228600" y="990600"/>
+            <a:ext cx="6125395" cy="1477328"/>
+          </a:xfrm>
+          <a:prstGeom prst="rect">
+            <a:avLst/>
+          </a:prstGeom>
+          <a:noFill/>
+        </p:spPr>
+        <p:txBody>
+          <a:bodyPr wrap="none" rtlCol="0">
+            <a:spAutoFit/>
+          </a:bodyPr>
+          <a:lstStyle/>
+          <a:p>
+            <a:pPr marL="285750" indent="-285750">
+              <a:buFont typeface="Wingdings" panose="05000000000000000000" pitchFamily="2" charset="2"/>
+              <a:buChar char="Ø"/>
+            </a:pPr>
+            <a:r>
+              <a:rPr lang="en-US" dirty="0" smtClean="0">
+                <a:latin typeface="Comic Sans MS" panose="030F0702030302020204" pitchFamily="66" charset="0"/>
+              </a:rPr>
+              <a:t>Redux is a predictable container for </a:t>
+            </a:r>
+            <a:r>
+              <a:rPr lang="en-US" dirty="0" err="1" smtClean="0">
+                <a:latin typeface="Comic Sans MS" panose="030F0702030302020204" pitchFamily="66" charset="0"/>
+              </a:rPr>
+              <a:t>Javascript</a:t>
+            </a:r>
+            <a:r>
+              <a:rPr lang="en-US" dirty="0" smtClean="0">
+                <a:latin typeface="Comic Sans MS" panose="030F0702030302020204" pitchFamily="66" charset="0"/>
+              </a:rPr>
+              <a:t> apps</a:t>
+            </a:r>
+          </a:p>
+          <a:p>
+            <a:pPr marL="285750" indent="-285750">
+              <a:buFont typeface="Wingdings" panose="05000000000000000000" pitchFamily="2" charset="2"/>
+              <a:buChar char="Ø"/>
+            </a:pPr>
+            <a:endParaRPr lang="en-US" dirty="0">
+              <a:latin typeface="Comic Sans MS" panose="030F0702030302020204" pitchFamily="66" charset="0"/>
+            </a:endParaRPr>
+          </a:p>
+          <a:p>
+            <a:pPr marL="285750" indent="-285750">
+              <a:buFont typeface="Wingdings" panose="05000000000000000000" pitchFamily="2" charset="2"/>
+              <a:buChar char="Ø"/>
+            </a:pPr>
+            <a:r>
+              <a:rPr lang="en-US" dirty="0" smtClean="0">
+                <a:latin typeface="Comic Sans MS" panose="030F0702030302020204" pitchFamily="66" charset="0"/>
+              </a:rPr>
+              <a:t>It was inspired by </a:t>
+            </a:r>
+            <a:r>
+              <a:rPr lang="en-US" dirty="0" err="1" smtClean="0">
+                <a:latin typeface="Comic Sans MS" panose="030F0702030302020204" pitchFamily="66" charset="0"/>
+              </a:rPr>
+              <a:t>facebook</a:t>
+            </a:r>
+            <a:r>
+              <a:rPr lang="en-US" dirty="0" smtClean="0">
+                <a:latin typeface="Comic Sans MS" panose="030F0702030302020204" pitchFamily="66" charset="0"/>
+              </a:rPr>
+              <a:t> flux</a:t>
+            </a:r>
+          </a:p>
+          <a:p>
+            <a:pPr marL="285750" indent="-285750">
+              <a:buFont typeface="Wingdings" panose="05000000000000000000" pitchFamily="2" charset="2"/>
+              <a:buChar char="Ø"/>
+            </a:pPr>
+            <a:endParaRPr lang="en-US" dirty="0">
+              <a:latin typeface="Comic Sans MS" panose="030F0702030302020204" pitchFamily="66" charset="0"/>
+            </a:endParaRPr>
+          </a:p>
+          <a:p>
+            <a:pPr marL="285750" indent="-285750">
+              <a:buFont typeface="Wingdings" panose="05000000000000000000" pitchFamily="2" charset="2"/>
+              <a:buChar char="Ø"/>
+            </a:pPr>
+            <a:r>
+              <a:rPr lang="en-US" dirty="0" smtClean="0">
+                <a:latin typeface="Comic Sans MS" panose="030F0702030302020204" pitchFamily="66" charset="0"/>
+              </a:rPr>
+              <a:t>It can be used by React or any other library</a:t>
+            </a:r>
+            <a:endParaRPr lang="en-US" dirty="0">
+              <a:latin typeface="Comic Sans MS" panose="030F0702030302020204" pitchFamily="66" charset="0"/>
+            </a:endParaRPr>
+          </a:p>
+        </p:txBody>
+      </p:sp>
+    </p:spTree>
+    <p:extLst>
+      <p:ext uri="{BB962C8B-B14F-4D97-AF65-F5344CB8AC3E}">
+        <p14:creationId xmlns:p14="http://schemas.microsoft.com/office/powerpoint/2010/main" val="2323090975"/>
+      </p:ext>
+    </p:extLst>
+  </p:cSld>
+  <p:clrMapOvr>
+    <a:masterClrMapping/>
+  </p:clrMapOvr>
+</p:sld>
+</file>
+
+<file path=ppt/slides/slide3.xml><?xml version="1.0" encoding="utf-8"?>
+<p:sld xmlns:a="http://schemas.openxmlformats.org/drawingml/2006/main" xmlns:r="http://schemas.openxmlformats.org/officeDocument/2006/relationships" xmlns:p="http://schemas.openxmlformats.org/presentationml/2006/main" showMasterSp="0">
+  <p:cSld>
+    <p:spTree>
+      <p:nvGrpSpPr>
+        <p:cNvPr id="1" name=""/>
+        <p:cNvGrpSpPr/>
+        <p:nvPr/>
+      </p:nvGrpSpPr>
+      <p:grpSpPr>
+        <a:xfrm>
+          <a:off x="0" y="0"/>
+          <a:ext cx="0" cy="0"/>
+          <a:chOff x="0" y="0"/>
+          <a:chExt cx="0" cy="0"/>
+        </a:xfrm>
+      </p:grpSpPr>
+      <p:sp>
+        <p:nvSpPr>
+          <p:cNvPr id="6" name="TextBox 5"/>
+          <p:cNvSpPr txBox="1"/>
+          <p:nvPr/>
+        </p:nvSpPr>
+        <p:spPr>
+          <a:xfrm>
+            <a:off x="228600" y="304800"/>
+            <a:ext cx="2853666" cy="461665"/>
+          </a:xfrm>
+          <a:prstGeom prst="rect">
+            <a:avLst/>
+          </a:prstGeom>
+          <a:noFill/>
+        </p:spPr>
+        <p:txBody>
+          <a:bodyPr wrap="none" rtlCol="0">
+            <a:spAutoFit/>
+          </a:bodyPr>
+          <a:lstStyle/>
+          <a:p>
+            <a:r>
+              <a:rPr lang="en-US" sz="2400" b="1" dirty="0" smtClean="0">
+                <a:latin typeface="Comic Sans MS" panose="030F0702030302020204" pitchFamily="66" charset="0"/>
+              </a:rPr>
+              <a:t>Redux – Principles</a:t>
+            </a:r>
+            <a:endParaRPr lang="en-US" sz="2400" b="1" dirty="0">
+              <a:latin typeface="Comic Sans MS" panose="030F0702030302020204" pitchFamily="66" charset="0"/>
+            </a:endParaRPr>
+          </a:p>
+        </p:txBody>
+      </p:sp>
+      <p:sp>
+        <p:nvSpPr>
+          <p:cNvPr id="8" name="TextBox 7"/>
+          <p:cNvSpPr txBox="1"/>
+          <p:nvPr/>
+        </p:nvSpPr>
+        <p:spPr>
+          <a:xfrm>
+            <a:off x="228600" y="990600"/>
+            <a:ext cx="6838732" cy="1477328"/>
+          </a:xfrm>
+          <a:prstGeom prst="rect">
+            <a:avLst/>
+          </a:prstGeom>
+          <a:noFill/>
+        </p:spPr>
+        <p:txBody>
+          <a:bodyPr wrap="none" rtlCol="0">
+            <a:spAutoFit/>
+          </a:bodyPr>
+          <a:lstStyle/>
+          <a:p>
+            <a:pPr marL="285750" indent="-285750">
+              <a:buFont typeface="Wingdings" panose="05000000000000000000" pitchFamily="2" charset="2"/>
+              <a:buChar char="Ø"/>
+            </a:pPr>
+            <a:r>
+              <a:rPr lang="en-US" dirty="0" smtClean="0">
+                <a:latin typeface="Comic Sans MS" panose="030F0702030302020204" pitchFamily="66" charset="0"/>
+              </a:rPr>
+              <a:t>Single source of truth which is state</a:t>
+            </a:r>
+          </a:p>
+          <a:p>
+            <a:pPr marL="285750" indent="-285750">
+              <a:buFont typeface="Wingdings" panose="05000000000000000000" pitchFamily="2" charset="2"/>
+              <a:buChar char="Ø"/>
+            </a:pPr>
+            <a:endParaRPr lang="en-US" dirty="0">
+              <a:latin typeface="Comic Sans MS" panose="030F0702030302020204" pitchFamily="66" charset="0"/>
+            </a:endParaRPr>
+          </a:p>
+          <a:p>
+            <a:pPr marL="285750" indent="-285750">
+              <a:buFont typeface="Wingdings" panose="05000000000000000000" pitchFamily="2" charset="2"/>
+              <a:buChar char="Ø"/>
+            </a:pPr>
+            <a:r>
+              <a:rPr lang="en-US" dirty="0" smtClean="0">
+                <a:latin typeface="Comic Sans MS" panose="030F0702030302020204" pitchFamily="66" charset="0"/>
+              </a:rPr>
+              <a:t>State is read-only</a:t>
+            </a:r>
+          </a:p>
+          <a:p>
+            <a:pPr marL="285750" indent="-285750">
+              <a:buFont typeface="Wingdings" panose="05000000000000000000" pitchFamily="2" charset="2"/>
+              <a:buChar char="Ø"/>
+            </a:pPr>
+            <a:endParaRPr lang="en-US" dirty="0">
+              <a:latin typeface="Comic Sans MS" panose="030F0702030302020204" pitchFamily="66" charset="0"/>
+            </a:endParaRPr>
+          </a:p>
+          <a:p>
+            <a:pPr marL="285750" indent="-285750">
+              <a:buFont typeface="Wingdings" panose="05000000000000000000" pitchFamily="2" charset="2"/>
+              <a:buChar char="Ø"/>
+            </a:pPr>
+            <a:r>
+              <a:rPr lang="en-US" dirty="0" smtClean="0">
+                <a:latin typeface="Comic Sans MS" panose="030F0702030302020204" pitchFamily="66" charset="0"/>
+              </a:rPr>
+              <a:t>Changes are made by Pure functions by triggering an action</a:t>
+            </a:r>
+            <a:endParaRPr lang="en-US" dirty="0">
+              <a:latin typeface="Comic Sans MS" panose="030F0702030302020204" pitchFamily="66" charset="0"/>
+            </a:endParaRPr>
+          </a:p>
+        </p:txBody>
+      </p:sp>
+    </p:spTree>
+    <p:extLst>
+      <p:ext uri="{BB962C8B-B14F-4D97-AF65-F5344CB8AC3E}">
+        <p14:creationId xmlns:p14="http://schemas.microsoft.com/office/powerpoint/2010/main" val="969227017"/>
+      </p:ext>
+    </p:extLst>
+  </p:cSld>
+  <p:clrMapOvr>
+    <a:masterClrMapping/>
+  </p:clrMapOvr>
+</p:sld>
+</file>
+
+<file path=ppt/slides/slide4.xml><?xml version="1.0" encoding="utf-8"?>
+<p:sld xmlns:a="http://schemas.openxmlformats.org/drawingml/2006/main" xmlns:r="http://schemas.openxmlformats.org/officeDocument/2006/relationships" xmlns:p="http://schemas.openxmlformats.org/presentationml/2006/main" showMasterSp="0">
+  <p:cSld>
+    <p:spTree>
+      <p:nvGrpSpPr>
+        <p:cNvPr id="1" name=""/>
+        <p:cNvGrpSpPr/>
+        <p:nvPr/>
+      </p:nvGrpSpPr>
+      <p:grpSpPr>
+        <a:xfrm>
+          <a:off x="0" y="0"/>
+          <a:ext cx="0" cy="0"/>
+          <a:chOff x="0" y="0"/>
+          <a:chExt cx="0" cy="0"/>
+        </a:xfrm>
+      </p:grpSpPr>
+      <p:sp>
+        <p:nvSpPr>
+          <p:cNvPr id="6" name="TextBox 5"/>
+          <p:cNvSpPr txBox="1"/>
+          <p:nvPr/>
+        </p:nvSpPr>
+        <p:spPr>
+          <a:xfrm>
+            <a:off x="228600" y="304800"/>
+            <a:ext cx="4935967" cy="461665"/>
+          </a:xfrm>
+          <a:prstGeom prst="rect">
+            <a:avLst/>
+          </a:prstGeom>
+          <a:noFill/>
+        </p:spPr>
+        <p:txBody>
+          <a:bodyPr wrap="none" rtlCol="0">
+            <a:spAutoFit/>
+          </a:bodyPr>
+          <a:lstStyle/>
+          <a:p>
+            <a:r>
+              <a:rPr lang="en-US" sz="2400" b="1" dirty="0" smtClean="0">
+                <a:latin typeface="Comic Sans MS" panose="030F0702030302020204" pitchFamily="66" charset="0"/>
+              </a:rPr>
+              <a:t>Redux – Single Source of Truth</a:t>
+            </a:r>
+            <a:endParaRPr lang="en-US" sz="2400" b="1" dirty="0">
+              <a:latin typeface="Comic Sans MS" panose="030F0702030302020204" pitchFamily="66" charset="0"/>
+            </a:endParaRPr>
+          </a:p>
+        </p:txBody>
+      </p:sp>
+      <p:sp>
+        <p:nvSpPr>
+          <p:cNvPr id="8" name="TextBox 7"/>
+          <p:cNvSpPr txBox="1"/>
+          <p:nvPr/>
+        </p:nvSpPr>
+        <p:spPr>
+          <a:xfrm>
+            <a:off x="228600" y="990600"/>
+            <a:ext cx="5801588" cy="923330"/>
+          </a:xfrm>
+          <a:prstGeom prst="rect">
+            <a:avLst/>
+          </a:prstGeom>
+          <a:noFill/>
+        </p:spPr>
+        <p:txBody>
+          <a:bodyPr wrap="none" rtlCol="0">
+            <a:spAutoFit/>
+          </a:bodyPr>
+          <a:lstStyle/>
+          <a:p>
+            <a:pPr marL="285750" indent="-285750">
+              <a:buFont typeface="Wingdings" panose="05000000000000000000" pitchFamily="2" charset="2"/>
+              <a:buChar char="Ø"/>
+            </a:pPr>
+            <a:r>
+              <a:rPr lang="en-US" dirty="0" smtClean="0">
+                <a:latin typeface="Comic Sans MS" panose="030F0702030302020204" pitchFamily="66" charset="0"/>
+              </a:rPr>
+              <a:t>The application state is stored in a single location</a:t>
+            </a:r>
+          </a:p>
+          <a:p>
+            <a:pPr marL="285750" indent="-285750">
+              <a:buFont typeface="Wingdings" panose="05000000000000000000" pitchFamily="2" charset="2"/>
+              <a:buChar char="Ø"/>
+            </a:pPr>
+            <a:endParaRPr lang="en-US" dirty="0">
+              <a:latin typeface="Comic Sans MS" panose="030F0702030302020204" pitchFamily="66" charset="0"/>
+            </a:endParaRPr>
+          </a:p>
+          <a:p>
+            <a:pPr marL="285750" indent="-285750">
+              <a:buFont typeface="Wingdings" panose="05000000000000000000" pitchFamily="2" charset="2"/>
+              <a:buChar char="Ø"/>
+            </a:pPr>
+            <a:r>
+              <a:rPr lang="en-US" dirty="0" smtClean="0">
+                <a:latin typeface="Comic Sans MS" panose="030F0702030302020204" pitchFamily="66" charset="0"/>
+              </a:rPr>
+              <a:t>Do not scatter the state over </a:t>
+            </a:r>
+            <a:r>
+              <a:rPr lang="en-US" dirty="0" err="1" smtClean="0">
+                <a:latin typeface="Comic Sans MS" panose="030F0702030302020204" pitchFamily="66" charset="0"/>
+              </a:rPr>
+              <a:t>lts</a:t>
+            </a:r>
+            <a:r>
+              <a:rPr lang="en-US" dirty="0" smtClean="0">
+                <a:latin typeface="Comic Sans MS" panose="030F0702030302020204" pitchFamily="66" charset="0"/>
+              </a:rPr>
+              <a:t> of components</a:t>
+            </a:r>
+          </a:p>
+        </p:txBody>
+      </p:sp>
+    </p:spTree>
+    <p:extLst>
+      <p:ext uri="{BB962C8B-B14F-4D97-AF65-F5344CB8AC3E}">
+        <p14:creationId xmlns:p14="http://schemas.microsoft.com/office/powerpoint/2010/main" val="108341493"/>
+      </p:ext>
+    </p:extLst>
+  </p:cSld>
+  <p:clrMapOvr>
+    <a:masterClrMapping/>
+  </p:clrMapOvr>
+</p:sld>
+</file>
+
+<file path=ppt/slides/slide5.xml><?xml version="1.0" encoding="utf-8"?>
+<p:sld xmlns:a="http://schemas.openxmlformats.org/drawingml/2006/main" xmlns:r="http://schemas.openxmlformats.org/officeDocument/2006/relationships" xmlns:p="http://schemas.openxmlformats.org/presentationml/2006/main" showMasterSp="0">
+  <p:cSld>
+    <p:spTree>
+      <p:nvGrpSpPr>
+        <p:cNvPr id="1" name=""/>
+        <p:cNvGrpSpPr/>
+        <p:nvPr/>
+      </p:nvGrpSpPr>
+      <p:grpSpPr>
+        <a:xfrm>
+          <a:off x="0" y="0"/>
+          <a:ext cx="0" cy="0"/>
+          <a:chOff x="0" y="0"/>
+          <a:chExt cx="0" cy="0"/>
+        </a:xfrm>
+      </p:grpSpPr>
+      <p:sp>
+        <p:nvSpPr>
+          <p:cNvPr id="6" name="TextBox 5"/>
+          <p:cNvSpPr txBox="1"/>
+          <p:nvPr/>
+        </p:nvSpPr>
+        <p:spPr>
+          <a:xfrm>
+            <a:off x="228600" y="304800"/>
+            <a:ext cx="4198585" cy="461665"/>
+          </a:xfrm>
+          <a:prstGeom prst="rect">
+            <a:avLst/>
+          </a:prstGeom>
+          <a:noFill/>
+        </p:spPr>
+        <p:txBody>
+          <a:bodyPr wrap="none" rtlCol="0">
+            <a:spAutoFit/>
+          </a:bodyPr>
+          <a:lstStyle/>
+          <a:p>
+            <a:r>
+              <a:rPr lang="en-US" sz="2400" b="1" dirty="0" smtClean="0">
+                <a:latin typeface="Comic Sans MS" panose="030F0702030302020204" pitchFamily="66" charset="0"/>
+              </a:rPr>
+              <a:t>Redux – state is read-only</a:t>
+            </a:r>
+            <a:endParaRPr lang="en-US" sz="2400" b="1" dirty="0">
+              <a:latin typeface="Comic Sans MS" panose="030F0702030302020204" pitchFamily="66" charset="0"/>
+            </a:endParaRPr>
+          </a:p>
+        </p:txBody>
+      </p:sp>
+      <p:sp>
+        <p:nvSpPr>
+          <p:cNvPr id="8" name="TextBox 7"/>
+          <p:cNvSpPr txBox="1"/>
+          <p:nvPr/>
+        </p:nvSpPr>
+        <p:spPr>
+          <a:xfrm>
+            <a:off x="228600" y="990600"/>
+            <a:ext cx="8541121" cy="1477328"/>
+          </a:xfrm>
+          <a:prstGeom prst="rect">
+            <a:avLst/>
+          </a:prstGeom>
+          <a:noFill/>
+        </p:spPr>
+        <p:txBody>
+          <a:bodyPr wrap="none" rtlCol="0">
+            <a:spAutoFit/>
+          </a:bodyPr>
+          <a:lstStyle/>
+          <a:p>
+            <a:pPr marL="285750" indent="-285750">
+              <a:buFont typeface="Wingdings" panose="05000000000000000000" pitchFamily="2" charset="2"/>
+              <a:buChar char="Ø"/>
+            </a:pPr>
+            <a:r>
+              <a:rPr lang="en-US" dirty="0" smtClean="0">
+                <a:latin typeface="Comic Sans MS" panose="030F0702030302020204" pitchFamily="66" charset="0"/>
+              </a:rPr>
+              <a:t>The state objects are never changed directly by the application</a:t>
+            </a:r>
+          </a:p>
+          <a:p>
+            <a:pPr marL="285750" indent="-285750">
+              <a:buFont typeface="Wingdings" panose="05000000000000000000" pitchFamily="2" charset="2"/>
+              <a:buChar char="Ø"/>
+            </a:pPr>
+            <a:endParaRPr lang="en-US" dirty="0">
+              <a:latin typeface="Comic Sans MS" panose="030F0702030302020204" pitchFamily="66" charset="0"/>
+            </a:endParaRPr>
+          </a:p>
+          <a:p>
+            <a:pPr marL="285750" indent="-285750">
+              <a:buFont typeface="Wingdings" panose="05000000000000000000" pitchFamily="2" charset="2"/>
+              <a:buChar char="Ø"/>
+            </a:pPr>
+            <a:r>
+              <a:rPr lang="en-US" dirty="0" smtClean="0">
+                <a:latin typeface="Comic Sans MS" panose="030F0702030302020204" pitchFamily="66" charset="0"/>
+              </a:rPr>
+              <a:t>Every state change is the result of an action being dispatched to the store</a:t>
+            </a:r>
+          </a:p>
+          <a:p>
+            <a:pPr marL="285750" indent="-285750">
+              <a:buFont typeface="Wingdings" panose="05000000000000000000" pitchFamily="2" charset="2"/>
+              <a:buChar char="Ø"/>
+            </a:pPr>
+            <a:endParaRPr lang="en-US" dirty="0">
+              <a:latin typeface="Comic Sans MS" panose="030F0702030302020204" pitchFamily="66" charset="0"/>
+            </a:endParaRPr>
+          </a:p>
+          <a:p>
+            <a:pPr marL="285750" indent="-285750">
+              <a:buFont typeface="Wingdings" panose="05000000000000000000" pitchFamily="2" charset="2"/>
+              <a:buChar char="Ø"/>
+            </a:pPr>
+            <a:r>
+              <a:rPr lang="en-US" dirty="0" smtClean="0">
+                <a:latin typeface="Comic Sans MS" panose="030F0702030302020204" pitchFamily="66" charset="0"/>
+              </a:rPr>
+              <a:t>This action describes the intended state changes </a:t>
+            </a:r>
+          </a:p>
+        </p:txBody>
+      </p:sp>
+    </p:spTree>
+    <p:extLst>
+      <p:ext uri="{BB962C8B-B14F-4D97-AF65-F5344CB8AC3E}">
+        <p14:creationId xmlns:p14="http://schemas.microsoft.com/office/powerpoint/2010/main" val="2951272043"/>
+      </p:ext>
+    </p:extLst>
+  </p:cSld>
+  <p:clrMapOvr>
+    <a:masterClrMapping/>
+  </p:clrMapOvr>
+</p:sld>
+</file>
+
+<file path=ppt/slides/slide6.xml><?xml version="1.0" encoding="utf-8"?>
+<p:sld xmlns:a="http://schemas.openxmlformats.org/drawingml/2006/main" xmlns:r="http://schemas.openxmlformats.org/officeDocument/2006/relationships" xmlns:p="http://schemas.openxmlformats.org/presentationml/2006/main" showMasterSp="0">
+  <p:cSld>
+    <p:spTree>
+      <p:nvGrpSpPr>
+        <p:cNvPr id="1" name=""/>
+        <p:cNvGrpSpPr/>
+        <p:nvPr/>
+      </p:nvGrpSpPr>
+      <p:grpSpPr>
+        <a:xfrm>
+          <a:off x="0" y="0"/>
+          <a:ext cx="0" cy="0"/>
+          <a:chOff x="0" y="0"/>
+          <a:chExt cx="0" cy="0"/>
+        </a:xfrm>
+      </p:grpSpPr>
+      <p:sp>
+        <p:nvSpPr>
+          <p:cNvPr id="6" name="TextBox 5"/>
+          <p:cNvSpPr txBox="1"/>
+          <p:nvPr/>
+        </p:nvSpPr>
+        <p:spPr>
+          <a:xfrm>
+            <a:off x="228600" y="304800"/>
+            <a:ext cx="3595856" cy="461665"/>
+          </a:xfrm>
+          <a:prstGeom prst="rect">
+            <a:avLst/>
+          </a:prstGeom>
+          <a:noFill/>
+        </p:spPr>
+        <p:txBody>
+          <a:bodyPr wrap="none" rtlCol="0">
+            <a:spAutoFit/>
+          </a:bodyPr>
+          <a:lstStyle/>
+          <a:p>
+            <a:r>
+              <a:rPr lang="en-US" sz="2400" b="1" dirty="0" smtClean="0">
+                <a:latin typeface="Comic Sans MS" panose="030F0702030302020204" pitchFamily="66" charset="0"/>
+              </a:rPr>
+              <a:t>Redux – Pure functions</a:t>
+            </a:r>
+            <a:endParaRPr lang="en-US" sz="2400" b="1" dirty="0">
+              <a:latin typeface="Comic Sans MS" panose="030F0702030302020204" pitchFamily="66" charset="0"/>
+            </a:endParaRPr>
+          </a:p>
+        </p:txBody>
+      </p:sp>
+      <p:sp>
+        <p:nvSpPr>
+          <p:cNvPr id="8" name="TextBox 7"/>
+          <p:cNvSpPr txBox="1"/>
+          <p:nvPr/>
+        </p:nvSpPr>
+        <p:spPr>
+          <a:xfrm>
+            <a:off x="228600" y="990600"/>
+            <a:ext cx="8760732" cy="1754326"/>
+          </a:xfrm>
+          <a:prstGeom prst="rect">
+            <a:avLst/>
+          </a:prstGeom>
+          <a:noFill/>
+        </p:spPr>
+        <p:txBody>
+          <a:bodyPr wrap="none" rtlCol="0">
+            <a:spAutoFit/>
+          </a:bodyPr>
+          <a:lstStyle/>
+          <a:p>
+            <a:pPr marL="285750" indent="-285750">
+              <a:buFont typeface="Wingdings" panose="05000000000000000000" pitchFamily="2" charset="2"/>
+              <a:buChar char="Ø"/>
+            </a:pPr>
+            <a:r>
+              <a:rPr lang="en-US" dirty="0" smtClean="0">
+                <a:latin typeface="Comic Sans MS" panose="030F0702030302020204" pitchFamily="66" charset="0"/>
+              </a:rPr>
+              <a:t>The return values of pure function is depends on its </a:t>
+            </a:r>
+            <a:r>
+              <a:rPr lang="en-US" dirty="0" err="1" smtClean="0">
+                <a:latin typeface="Comic Sans MS" panose="030F0702030302020204" pitchFamily="66" charset="0"/>
+              </a:rPr>
+              <a:t>args</a:t>
+            </a:r>
+            <a:r>
+              <a:rPr lang="en-US" dirty="0" smtClean="0">
+                <a:latin typeface="Comic Sans MS" panose="030F0702030302020204" pitchFamily="66" charset="0"/>
+              </a:rPr>
+              <a:t> </a:t>
+            </a:r>
+            <a:r>
+              <a:rPr lang="en-US" dirty="0" err="1" smtClean="0">
+                <a:latin typeface="Comic Sans MS" panose="030F0702030302020204" pitchFamily="66" charset="0"/>
+              </a:rPr>
+              <a:t>Hgence</a:t>
+            </a:r>
+            <a:r>
+              <a:rPr lang="en-US" dirty="0" smtClean="0">
+                <a:latin typeface="Comic Sans MS" panose="030F0702030302020204" pitchFamily="66" charset="0"/>
+              </a:rPr>
+              <a:t>, if you call </a:t>
+            </a:r>
+          </a:p>
+          <a:p>
+            <a:r>
+              <a:rPr lang="en-US" dirty="0" smtClean="0">
+                <a:latin typeface="Comic Sans MS" panose="030F0702030302020204" pitchFamily="66" charset="0"/>
+              </a:rPr>
+              <a:t>the pure function with the same set of </a:t>
+            </a:r>
+            <a:r>
+              <a:rPr lang="en-US" dirty="0" err="1" smtClean="0">
+                <a:latin typeface="Comic Sans MS" panose="030F0702030302020204" pitchFamily="66" charset="0"/>
+              </a:rPr>
+              <a:t>args</a:t>
+            </a:r>
+            <a:r>
+              <a:rPr lang="en-US" dirty="0" smtClean="0">
+                <a:latin typeface="Comic Sans MS" panose="030F0702030302020204" pitchFamily="66" charset="0"/>
+              </a:rPr>
+              <a:t>, you will always get the same values</a:t>
+            </a:r>
+          </a:p>
+          <a:p>
+            <a:endParaRPr lang="en-US" dirty="0">
+              <a:latin typeface="Comic Sans MS" panose="030F0702030302020204" pitchFamily="66" charset="0"/>
+            </a:endParaRPr>
+          </a:p>
+          <a:p>
+            <a:pPr marL="285750" indent="-285750">
+              <a:buFont typeface="Wingdings" panose="05000000000000000000" pitchFamily="2" charset="2"/>
+              <a:buChar char="Ø"/>
+            </a:pPr>
+            <a:r>
+              <a:rPr lang="en-US" dirty="0" smtClean="0">
+                <a:latin typeface="Comic Sans MS" panose="030F0702030302020204" pitchFamily="66" charset="0"/>
+              </a:rPr>
+              <a:t>They do not have any side effects like network, database calls</a:t>
+            </a:r>
+          </a:p>
+          <a:p>
+            <a:pPr marL="285750" indent="-285750">
+              <a:buFont typeface="Wingdings" panose="05000000000000000000" pitchFamily="2" charset="2"/>
+              <a:buChar char="Ø"/>
+            </a:pPr>
+            <a:endParaRPr lang="en-US" dirty="0">
+              <a:latin typeface="Comic Sans MS" panose="030F0702030302020204" pitchFamily="66" charset="0"/>
+            </a:endParaRPr>
+          </a:p>
+          <a:p>
+            <a:pPr marL="285750" indent="-285750">
+              <a:buFont typeface="Wingdings" panose="05000000000000000000" pitchFamily="2" charset="2"/>
+              <a:buChar char="Ø"/>
+            </a:pPr>
+            <a:r>
+              <a:rPr lang="en-US" dirty="0" smtClean="0">
+                <a:latin typeface="Comic Sans MS" panose="030F0702030302020204" pitchFamily="66" charset="0"/>
+              </a:rPr>
+              <a:t>They do not modify the </a:t>
+            </a:r>
+            <a:r>
+              <a:rPr lang="en-US" dirty="0" err="1" smtClean="0">
+                <a:latin typeface="Comic Sans MS" panose="030F0702030302020204" pitchFamily="66" charset="0"/>
+              </a:rPr>
+              <a:t>args</a:t>
+            </a:r>
+            <a:r>
+              <a:rPr lang="en-US" dirty="0" smtClean="0">
+                <a:latin typeface="Comic Sans MS" panose="030F0702030302020204" pitchFamily="66" charset="0"/>
+              </a:rPr>
+              <a:t> passed to the pure function</a:t>
+            </a:r>
+          </a:p>
+        </p:txBody>
+      </p:sp>
+      <p:pic>
+        <p:nvPicPr>
+          <p:cNvPr id="1026" name="Picture 2"/>
+          <p:cNvPicPr>
+            <a:picLocks noChangeAspect="1" noChangeArrowheads="1"/>
+          </p:cNvPicPr>
+          <p:nvPr/>
+        </p:nvPicPr>
+        <p:blipFill>
+          <a:blip r:embed="rId2">
+            <a:extLst>
+              <a:ext uri="{28A0092B-C50C-407E-A947-70E740481C1C}">
+                <a14:useLocalDpi xmlns:a14="http://schemas.microsoft.com/office/drawing/2010/main" val="0"/>
+              </a:ext>
+            </a:extLst>
+          </a:blip>
+          <a:srcRect/>
+          <a:stretch>
+            <a:fillRect/>
+          </a:stretch>
+        </p:blipFill>
+        <p:spPr bwMode="auto">
+          <a:xfrm>
+            <a:off x="586457" y="2730130"/>
+            <a:ext cx="2628900" cy="1752600"/>
+          </a:xfrm>
+          <a:prstGeom prst="rect">
+            <a:avLst/>
+          </a:prstGeom>
+          <a:noFill/>
+          <a:ln>
+            <a:noFill/>
+          </a:ln>
+          <a:extLst>
+            <a:ext uri="{909E8E84-426E-40DD-AFC4-6F175D3DCCD1}">
+              <a14:hiddenFill xmlns:a14="http://schemas.microsoft.com/office/drawing/2010/main">
+                <a:solidFill>
+                  <a:schemeClr val="accent1"/>
+                </a:solidFill>
+              </a14:hiddenFill>
+            </a:ext>
+            <a:ext uri="{91240B29-F687-4F45-9708-019B960494DF}">
+              <a14:hiddenLine xmlns:a14="http://schemas.microsoft.com/office/drawing/2010/main" w="9525">
+                <a:solidFill>
+                  <a:schemeClr val="tx1"/>
+                </a:solidFill>
+                <a:miter lim="800000"/>
+                <a:headEnd/>
+                <a:tailEnd/>
+              </a14:hiddenLine>
+            </a:ext>
+          </a:extLst>
+        </p:spPr>
+      </p:pic>
+      <p:pic>
+        <p:nvPicPr>
+          <p:cNvPr id="1027" name="Picture 3"/>
+          <p:cNvPicPr>
+            <a:picLocks noChangeAspect="1" noChangeArrowheads="1"/>
+          </p:cNvPicPr>
+          <p:nvPr/>
+        </p:nvPicPr>
+        <p:blipFill>
+          <a:blip r:embed="rId3">
+            <a:extLst>
+              <a:ext uri="{28A0092B-C50C-407E-A947-70E740481C1C}">
+                <a14:useLocalDpi xmlns:a14="http://schemas.microsoft.com/office/drawing/2010/main" val="0"/>
+              </a:ext>
+            </a:extLst>
+          </a:blip>
+          <a:srcRect/>
+          <a:stretch>
+            <a:fillRect/>
+          </a:stretch>
+        </p:blipFill>
+        <p:spPr bwMode="auto">
+          <a:xfrm>
+            <a:off x="586457" y="4572000"/>
+            <a:ext cx="3657600" cy="2095500"/>
+          </a:xfrm>
+          <a:prstGeom prst="rect">
+            <a:avLst/>
+          </a:prstGeom>
+          <a:noFill/>
+          <a:ln>
+            <a:noFill/>
+          </a:ln>
+          <a:extLst>
+            <a:ext uri="{909E8E84-426E-40DD-AFC4-6F175D3DCCD1}">
+              <a14:hiddenFill xmlns:a14="http://schemas.microsoft.com/office/drawing/2010/main">
+                <a:solidFill>
+                  <a:schemeClr val="accent1"/>
+                </a:solidFill>
+              </a14:hiddenFill>
+            </a:ext>
+            <a:ext uri="{91240B29-F687-4F45-9708-019B960494DF}">
+              <a14:hiddenLine xmlns:a14="http://schemas.microsoft.com/office/drawing/2010/main" w="9525">
+                <a:solidFill>
+                  <a:schemeClr val="tx1"/>
+                </a:solidFill>
+                <a:miter lim="800000"/>
+                <a:headEnd/>
+                <a:tailEnd/>
+              </a14:hiddenLine>
+            </a:ext>
+          </a:extLst>
+        </p:spPr>
+      </p:pic>
+    </p:spTree>
+    <p:extLst>
+      <p:ext uri="{BB962C8B-B14F-4D97-AF65-F5344CB8AC3E}">
+        <p14:creationId xmlns:p14="http://schemas.microsoft.com/office/powerpoint/2010/main" val="4104629937"/>
       </p:ext>
     </p:extLst>
   </p:cSld>

</xml_diff>